<commit_message>
added Cheers slide at the end :)
</commit_message>
<xml_diff>
--- a/TeamSazerac.pptx
+++ b/TeamSazerac.pptx
@@ -10,6 +10,7 @@
     <p:sldId id="350" r:id="rId4"/>
     <p:sldId id="353" r:id="rId5"/>
     <p:sldId id="354" r:id="rId6"/>
+    <p:sldId id="355" r:id="rId7"/>
   </p:sldIdLst>
   <p:sldSz cx="9144000" cy="6858000" type="screen4x3"/>
   <p:notesSz cx="6858000" cy="9144000"/>
@@ -110,7 +111,7 @@
   </p:defaultTextStyle>
   <p:extLst>
     <p:ext uri="{EFAFB233-063F-42B5-8137-9DF3F51BA10A}">
-      <p15:sldGuideLst xmlns="" xmlns:p15="http://schemas.microsoft.com/office/powerpoint/2012/main"/>
+      <p15:sldGuideLst xmlns:p15="http://schemas.microsoft.com/office/powerpoint/2012/main" xmlns=""/>
     </p:ext>
   </p:extLst>
 </p:presentation>
@@ -5006,27 +5007,7 @@
                   </a:schemeClr>
                 </a:solidFill>
               </a:rPr>
-              <a:t>JavaScript </a:t>
-            </a:r>
-            <a:r>
-              <a:rPr lang="en-US" sz="2400" dirty="0" smtClean="0">
-                <a:solidFill>
-                  <a:schemeClr val="tx2">
-                    <a:lumMod val="50000"/>
-                  </a:schemeClr>
-                </a:solidFill>
-              </a:rPr>
-              <a:t>DOM and UI </a:t>
-            </a:r>
-            <a:r>
-              <a:rPr lang="en-US" sz="2400" dirty="0" smtClean="0">
-                <a:solidFill>
-                  <a:schemeClr val="tx2">
-                    <a:lumMod val="50000"/>
-                  </a:schemeClr>
-                </a:solidFill>
-              </a:rPr>
-              <a:t>Teamwork</a:t>
+              <a:t>JavaScript DOM and UI Teamwork</a:t>
             </a:r>
             <a:endParaRPr lang="en-US" sz="2400" dirty="0">
               <a:solidFill>
@@ -5419,7 +5400,7 @@
         <p:spPr>
           <a:xfrm>
             <a:off x="111968" y="1250301"/>
-            <a:ext cx="8938726" cy="5401479"/>
+            <a:ext cx="8938726" cy="5047536"/>
           </a:xfrm>
           <a:prstGeom prst="rect">
             <a:avLst/>
@@ -5455,6 +5436,10 @@
             </a:endParaRPr>
           </a:p>
           <a:p>
+            <a:pPr marL="342900" indent="-342900">
+              <a:buFont typeface="Arial" panose="020B0604020202020204" pitchFamily="34" charset="0"/>
+              <a:buChar char="•"/>
+            </a:pPr>
             <a:r>
               <a:rPr lang="en-US" sz="2300" dirty="0" smtClean="0">
                 <a:solidFill>
@@ -5488,10 +5473,10 @@
                   </a:schemeClr>
                 </a:solidFill>
               </a:rPr>
-              <a:t>drunkbird.js creates the model of the </a:t>
-            </a:r>
-            <a:r>
-              <a:rPr lang="en-US" sz="2300" dirty="0" smtClean="0">
+              <a:t>drunkbird.js creates the model of the bird( named </a:t>
+            </a:r>
+            <a:r>
+              <a:rPr lang="en-US" sz="2300" dirty="0" err="1" smtClean="0">
                 <a:solidFill>
                   <a:schemeClr val="tx1">
                     <a:lumMod val="20000"/>
@@ -5499,10 +5484,10 @@
                   </a:schemeClr>
                 </a:solidFill>
               </a:rPr>
-              <a:t>bird( named </a:t>
-            </a:r>
-            <a:r>
-              <a:rPr lang="en-US" sz="2300" dirty="0" err="1" smtClean="0">
+              <a:t>drunkBurd</a:t>
+            </a:r>
+            <a:r>
+              <a:rPr lang="en-US" sz="2300" dirty="0" smtClean="0">
                 <a:solidFill>
                   <a:schemeClr val="tx1">
                     <a:lumMod val="20000"/>
@@ -5510,10 +5495,12 @@
                   </a:schemeClr>
                 </a:solidFill>
               </a:rPr>
-              <a:t>drunkBurd</a:t>
-            </a:r>
-            <a:r>
-              <a:rPr lang="en-US" sz="2300" dirty="0" smtClean="0">
+              <a:t>)</a:t>
+            </a:r>
+          </a:p>
+          <a:p>
+            <a:r>
+              <a:rPr lang="en-US" sz="2300" dirty="0">
                 <a:solidFill>
                   <a:schemeClr val="tx1">
                     <a:lumMod val="20000"/>
@@ -5521,8 +5508,32 @@
                   </a:schemeClr>
                 </a:solidFill>
               </a:rPr>
-              <a:t>)</a:t>
-            </a:r>
+              <a:t> - </a:t>
+            </a:r>
+            <a:r>
+              <a:rPr lang="en-US" sz="2300" dirty="0" err="1" smtClean="0">
+                <a:solidFill>
+                  <a:schemeClr val="tx1">
+                    <a:lumMod val="20000"/>
+                    <a:lumOff val="80000"/>
+                  </a:schemeClr>
+                </a:solidFill>
+              </a:rPr>
+              <a:t>drawableObject</a:t>
+            </a:r>
+            <a:r>
+              <a:rPr lang="en-US" sz="2300" dirty="0" smtClean="0">
+                <a:solidFill>
+                  <a:schemeClr val="tx1">
+                    <a:lumMod val="20000"/>
+                    <a:lumOff val="80000"/>
+                  </a:schemeClr>
+                </a:solidFill>
+              </a:rPr>
+              <a:t> is inherited by cocktail, soft drink and game obstacle objects.</a:t>
+            </a:r>
+          </a:p>
+          <a:p>
             <a:endParaRPr lang="en-US" sz="2300" dirty="0" smtClean="0">
               <a:solidFill>
                 <a:schemeClr val="tx1">
@@ -5533,114 +5544,10 @@
             </a:endParaRPr>
           </a:p>
           <a:p>
-            <a:r>
-              <a:rPr lang="en-US" sz="2300" dirty="0">
-                <a:solidFill>
-                  <a:schemeClr val="tx1">
-                    <a:lumMod val="20000"/>
-                    <a:lumOff val="80000"/>
-                  </a:schemeClr>
-                </a:solidFill>
-              </a:rPr>
-              <a:t> - </a:t>
-            </a:r>
-            <a:r>
-              <a:rPr lang="en-US" sz="2300" dirty="0" err="1" smtClean="0">
-                <a:solidFill>
-                  <a:schemeClr val="tx1">
-                    <a:lumMod val="20000"/>
-                    <a:lumOff val="80000"/>
-                  </a:schemeClr>
-                </a:solidFill>
-              </a:rPr>
-              <a:t>drawableObject</a:t>
-            </a:r>
-            <a:r>
-              <a:rPr lang="en-US" sz="2300" dirty="0" smtClean="0">
-                <a:solidFill>
-                  <a:schemeClr val="tx1">
-                    <a:lumMod val="20000"/>
-                    <a:lumOff val="80000"/>
-                  </a:schemeClr>
-                </a:solidFill>
-              </a:rPr>
-              <a:t> is</a:t>
-            </a:r>
-            <a:r>
-              <a:rPr lang="en-US" sz="2300" dirty="0" smtClean="0">
-                <a:solidFill>
-                  <a:schemeClr val="tx1">
-                    <a:lumMod val="20000"/>
-                    <a:lumOff val="80000"/>
-                  </a:schemeClr>
-                </a:solidFill>
-              </a:rPr>
-              <a:t> </a:t>
-            </a:r>
-            <a:r>
-              <a:rPr lang="en-US" sz="2300" dirty="0" smtClean="0">
-                <a:solidFill>
-                  <a:schemeClr val="tx1">
-                    <a:lumMod val="20000"/>
-                    <a:lumOff val="80000"/>
-                  </a:schemeClr>
-                </a:solidFill>
-              </a:rPr>
-              <a:t>inherited by cocktail, soft </a:t>
-            </a:r>
-            <a:r>
-              <a:rPr lang="en-US" sz="2300" dirty="0" smtClean="0">
-                <a:solidFill>
-                  <a:schemeClr val="tx1">
-                    <a:lumMod val="20000"/>
-                    <a:lumOff val="80000"/>
-                  </a:schemeClr>
-                </a:solidFill>
-              </a:rPr>
-              <a:t>drink </a:t>
-            </a:r>
-            <a:r>
-              <a:rPr lang="en-US" sz="2300" dirty="0" smtClean="0">
-                <a:solidFill>
-                  <a:schemeClr val="tx1">
-                    <a:lumMod val="20000"/>
-                    <a:lumOff val="80000"/>
-                  </a:schemeClr>
-                </a:solidFill>
-              </a:rPr>
-              <a:t>and game </a:t>
-            </a:r>
-            <a:r>
-              <a:rPr lang="en-US" sz="2300" dirty="0" smtClean="0">
-                <a:solidFill>
-                  <a:schemeClr val="tx1">
-                    <a:lumMod val="20000"/>
-                    <a:lumOff val="80000"/>
-                  </a:schemeClr>
-                </a:solidFill>
-              </a:rPr>
-              <a:t>obstacle objects.</a:t>
-            </a:r>
-            <a:endParaRPr lang="en-US" sz="2300" dirty="0" smtClean="0">
-              <a:solidFill>
-                <a:schemeClr val="tx1">
-                  <a:lumMod val="20000"/>
-                  <a:lumOff val="80000"/>
-                </a:schemeClr>
-              </a:solidFill>
-            </a:endParaRPr>
-          </a:p>
-          <a:p>
-            <a:endParaRPr lang="en-US" sz="2300" dirty="0" smtClean="0">
-              <a:solidFill>
-                <a:schemeClr val="tx1">
-                  <a:lumMod val="20000"/>
-                  <a:lumOff val="80000"/>
-                </a:schemeClr>
-              </a:solidFill>
-            </a:endParaRPr>
-          </a:p>
-          <a:p>
+            <a:pPr marL="342900" indent="-342900">
+              <a:buFont typeface="Arial" panose="020B0604020202020204" pitchFamily="34" charset="0"/>
+              <a:buChar char="•"/>
+            </a:pPr>
             <a:r>
               <a:rPr lang="en-US" sz="2300" dirty="0" smtClean="0">
                 <a:solidFill>
@@ -5671,10 +5578,10 @@
                   </a:schemeClr>
                 </a:solidFill>
               </a:rPr>
-              <a:t> - engine.js draws the objects in the browsers and defines how they </a:t>
-            </a:r>
-            <a:r>
-              <a:rPr lang="en-US" sz="2300" dirty="0" smtClean="0">
+              <a:t> - engine.js draws the objects in the browsers and defines how they interact(</a:t>
+            </a:r>
+            <a:r>
+              <a:rPr lang="en-US" sz="2300" dirty="0" err="1" smtClean="0">
                 <a:solidFill>
                   <a:schemeClr val="tx1">
                     <a:lumMod val="20000"/>
@@ -5682,10 +5589,10 @@
                   </a:schemeClr>
                 </a:solidFill>
               </a:rPr>
-              <a:t>interact(</a:t>
-            </a:r>
-            <a:r>
-              <a:rPr lang="en-US" sz="2300" dirty="0" err="1" smtClean="0">
+              <a:t>colision</a:t>
+            </a:r>
+            <a:r>
+              <a:rPr lang="en-US" sz="2300" dirty="0" smtClean="0">
                 <a:solidFill>
                   <a:schemeClr val="tx1">
                     <a:lumMod val="20000"/>
@@ -5693,7 +5600,7 @@
                   </a:schemeClr>
                 </a:solidFill>
               </a:rPr>
-              <a:t>colision</a:t>
+              <a:t> detection</a:t>
             </a:r>
             <a:r>
               <a:rPr lang="en-US" sz="2300" dirty="0" smtClean="0">
@@ -5704,8 +5611,10 @@
                   </a:schemeClr>
                 </a:solidFill>
               </a:rPr>
-              <a:t> detection).</a:t>
-            </a:r>
+              <a:t>).</a:t>
+            </a:r>
+          </a:p>
+          <a:p>
             <a:endParaRPr lang="en-US" sz="2300" dirty="0">
               <a:solidFill>
                 <a:schemeClr val="tx1">
@@ -5716,8 +5625,12 @@
             </a:endParaRPr>
           </a:p>
           <a:p>
-            <a:r>
-              <a:rPr lang="en-US" sz="2300" dirty="0" smtClean="0">
+            <a:pPr marL="342900" indent="-342900">
+              <a:buFont typeface="Arial" panose="020B0604020202020204" pitchFamily="34" charset="0"/>
+              <a:buChar char="•"/>
+            </a:pPr>
+            <a:r>
+              <a:rPr lang="en-US" sz="2300" dirty="0">
                 <a:solidFill>
                   <a:schemeClr val="tx1">
                     <a:lumMod val="20000"/>
@@ -5725,7 +5638,7 @@
                   </a:schemeClr>
                 </a:solidFill>
               </a:rPr>
-              <a:t>Secured better performance via the usage of different layers:</a:t>
+              <a:t>Implemented SVG</a:t>
             </a:r>
           </a:p>
           <a:p>
@@ -5738,70 +5651,18 @@
                   </a:schemeClr>
                 </a:solidFill>
               </a:rPr>
-              <a:t> - </a:t>
-            </a:r>
-            <a:r>
-              <a:rPr lang="en-US" sz="2300" dirty="0" smtClean="0">
-                <a:solidFill>
-                  <a:schemeClr val="tx1">
-                    <a:lumMod val="20000"/>
-                    <a:lumOff val="80000"/>
-                  </a:schemeClr>
-                </a:solidFill>
-              </a:rPr>
-              <a:t>background Layer</a:t>
-            </a:r>
-          </a:p>
-          <a:p>
-            <a:r>
-              <a:rPr lang="en-US" sz="2300" dirty="0" smtClean="0">
-                <a:solidFill>
-                  <a:schemeClr val="tx1">
-                    <a:lumMod val="20000"/>
-                    <a:lumOff val="80000"/>
-                  </a:schemeClr>
-                </a:solidFill>
-              </a:rPr>
-              <a:t> - drink Layer</a:t>
-            </a:r>
-          </a:p>
-          <a:p>
-            <a:r>
-              <a:rPr lang="en-US" sz="2300" dirty="0" smtClean="0">
-                <a:solidFill>
-                  <a:schemeClr val="tx1">
-                    <a:lumMod val="20000"/>
-                    <a:lumOff val="80000"/>
-                  </a:schemeClr>
-                </a:solidFill>
-              </a:rPr>
-              <a:t> - bird Layer</a:t>
-            </a:r>
-          </a:p>
-          <a:p>
-            <a:r>
-              <a:rPr lang="en-US" sz="2300" dirty="0">
-                <a:solidFill>
-                  <a:schemeClr val="tx1">
-                    <a:lumMod val="20000"/>
-                    <a:lumOff val="80000"/>
-                  </a:schemeClr>
-                </a:solidFill>
-              </a:rPr>
-              <a:t> - </a:t>
-            </a:r>
-            <a:r>
-              <a:rPr lang="en-US" sz="2300" dirty="0" smtClean="0">
-                <a:solidFill>
-                  <a:schemeClr val="tx1">
-                    <a:lumMod val="20000"/>
-                    <a:lumOff val="80000"/>
-                  </a:schemeClr>
-                </a:solidFill>
-              </a:rPr>
-              <a:t>obstacles Layer</a:t>
-            </a:r>
-            <a:endParaRPr lang="en-US" dirty="0" smtClean="0"/>
+              <a:t> - via timer and end game screen</a:t>
+            </a:r>
+          </a:p>
+          <a:p>
+            <a:endParaRPr lang="en-US" sz="2300" dirty="0">
+              <a:solidFill>
+                <a:schemeClr val="tx1">
+                  <a:lumMod val="20000"/>
+                  <a:lumOff val="80000"/>
+                </a:schemeClr>
+              </a:solidFill>
+            </a:endParaRPr>
           </a:p>
         </p:txBody>
       </p:sp>
@@ -5883,7 +5744,7 @@
         <p:spPr>
           <a:xfrm>
             <a:off x="270588" y="1660848"/>
-            <a:ext cx="8089642" cy="2492990"/>
+            <a:ext cx="8089642" cy="3554819"/>
           </a:xfrm>
           <a:prstGeom prst="rect">
             <a:avLst/>
@@ -5896,8 +5757,12 @@
           </a:bodyPr>
           <a:lstStyle/>
           <a:p>
-            <a:r>
-              <a:rPr lang="en-US" sz="2300" dirty="0">
+            <a:pPr marL="342900" indent="-342900">
+              <a:buFont typeface="Arial" panose="020B0604020202020204" pitchFamily="34" charset="0"/>
+              <a:buChar char="•"/>
+            </a:pPr>
+            <a:r>
+              <a:rPr lang="en-US" sz="2300" dirty="0" smtClean="0">
                 <a:solidFill>
                   <a:schemeClr val="tx1">
                     <a:lumMod val="20000"/>
@@ -5905,10 +5770,8 @@
                   </a:schemeClr>
                 </a:solidFill>
               </a:rPr>
-              <a:t>Implemented SVG</a:t>
-            </a:r>
-          </a:p>
-          <a:p>
+              <a:t>Secured </a:t>
+            </a:r>
             <a:r>
               <a:rPr lang="en-US" sz="2300" dirty="0">
                 <a:solidFill>
@@ -5918,8 +5781,61 @@
                   </a:schemeClr>
                 </a:solidFill>
               </a:rPr>
-              <a:t> - via timer and end game screen</a:t>
-            </a:r>
+              <a:t>better performance via the usage of different layers:</a:t>
+            </a:r>
+          </a:p>
+          <a:p>
+            <a:r>
+              <a:rPr lang="en-US" sz="2300" dirty="0">
+                <a:solidFill>
+                  <a:schemeClr val="tx1">
+                    <a:lumMod val="20000"/>
+                    <a:lumOff val="80000"/>
+                  </a:schemeClr>
+                </a:solidFill>
+              </a:rPr>
+              <a:t> - background Layer</a:t>
+            </a:r>
+          </a:p>
+          <a:p>
+            <a:r>
+              <a:rPr lang="en-US" sz="2300" dirty="0">
+                <a:solidFill>
+                  <a:schemeClr val="tx1">
+                    <a:lumMod val="20000"/>
+                    <a:lumOff val="80000"/>
+                  </a:schemeClr>
+                </a:solidFill>
+              </a:rPr>
+              <a:t> - drink Layer</a:t>
+            </a:r>
+          </a:p>
+          <a:p>
+            <a:r>
+              <a:rPr lang="en-US" sz="2300" dirty="0">
+                <a:solidFill>
+                  <a:schemeClr val="tx1">
+                    <a:lumMod val="20000"/>
+                    <a:lumOff val="80000"/>
+                  </a:schemeClr>
+                </a:solidFill>
+              </a:rPr>
+              <a:t> - bird Layer</a:t>
+            </a:r>
+          </a:p>
+          <a:p>
+            <a:r>
+              <a:rPr lang="en-US" sz="2300" dirty="0">
+                <a:solidFill>
+                  <a:schemeClr val="tx1">
+                    <a:lumMod val="20000"/>
+                    <a:lumOff val="80000"/>
+                  </a:schemeClr>
+                </a:solidFill>
+              </a:rPr>
+              <a:t> - obstacles Layer</a:t>
+            </a:r>
+            <a:endParaRPr lang="en-US" sz="2400" dirty="0"/>
           </a:p>
           <a:p>
             <a:endParaRPr lang="en-US" sz="2300" dirty="0" smtClean="0">
@@ -5932,6 +5848,10 @@
             </a:endParaRPr>
           </a:p>
           <a:p>
+            <a:pPr marL="342900" indent="-342900">
+              <a:buFont typeface="Arial" panose="020B0604020202020204" pitchFamily="34" charset="0"/>
+              <a:buChar char="•"/>
+            </a:pPr>
             <a:r>
               <a:rPr lang="en-US" sz="2300" dirty="0" smtClean="0">
                 <a:solidFill>
@@ -6022,6 +5942,59 @@
       </p:par>
     </p:tnLst>
   </p:timing>
+</p:sld>
+</file>
+
+<file path=ppt/slides/slide6.xml><?xml version="1.0" encoding="utf-8"?>
+<p:sld xmlns:a="http://schemas.openxmlformats.org/drawingml/2006/main" xmlns:r="http://schemas.openxmlformats.org/officeDocument/2006/relationships" xmlns:p="http://schemas.openxmlformats.org/presentationml/2006/main">
+  <p:cSld>
+    <p:spTree>
+      <p:nvGrpSpPr>
+        <p:cNvPr id="1" name=""/>
+        <p:cNvGrpSpPr/>
+        <p:nvPr/>
+      </p:nvGrpSpPr>
+      <p:grpSpPr>
+        <a:xfrm>
+          <a:off x="0" y="0"/>
+          <a:ext cx="0" cy="0"/>
+          <a:chOff x="0" y="0"/>
+          <a:chExt cx="0" cy="0"/>
+        </a:xfrm>
+      </p:grpSpPr>
+      <p:sp>
+        <p:nvSpPr>
+          <p:cNvPr id="2" name="Title 1"/>
+          <p:cNvSpPr>
+            <a:spLocks noGrp="1"/>
+          </p:cNvSpPr>
+          <p:nvPr>
+            <p:ph type="ctrTitle"/>
+          </p:nvPr>
+        </p:nvSpPr>
+        <p:spPr/>
+        <p:txBody>
+          <a:bodyPr/>
+          <a:lstStyle/>
+          <a:p>
+            <a:r>
+              <a:rPr lang="en-GB" dirty="0" smtClean="0"/>
+              <a:t>Cheers!</a:t>
+            </a:r>
+            <a:endParaRPr lang="bg-BG" dirty="0"/>
+          </a:p>
+        </p:txBody>
+      </p:sp>
+    </p:spTree>
+    <p:extLst>
+      <p:ext uri="{BB962C8B-B14F-4D97-AF65-F5344CB8AC3E}">
+        <p14:creationId xmlns:p14="http://schemas.microsoft.com/office/powerpoint/2010/main" val="786048158"/>
+      </p:ext>
+    </p:extLst>
+  </p:cSld>
+  <p:clrMapOvr>
+    <a:masterClrMapping/>
+  </p:clrMapOvr>
 </p:sld>
 </file>
 
@@ -6341,7 +6314,7 @@
   <a:extraClrSchemeLst/>
   <a:extLst>
     <a:ext uri="{05A4C25C-085E-4340-85A3-A5531E510DB2}">
-      <thm15:themeFamily xmlns="" xmlns:thm15="http://schemas.microsoft.com/office/thememl/2012/main" name="Telerik Academy theme" id="{2620D71C-A5FD-46E0-A488-16D4CF22AEE2}" vid="{F028A4D3-6851-4D6D-A82D-72CBFB9A818D}"/>
+      <thm15:themeFamily xmlns:thm15="http://schemas.microsoft.com/office/thememl/2012/main" xmlns="" name="Telerik Academy theme" id="{2620D71C-A5FD-46E0-A488-16D4CF22AEE2}" vid="{F028A4D3-6851-4D6D-A82D-72CBFB9A818D}"/>
     </a:ext>
   </a:extLst>
 </a:theme>

</xml_diff>